<commit_message>
He V2 and recap material
</commit_message>
<xml_diff>
--- a/Documentation/5. Recap Heuristic classifier.pptx
+++ b/Documentation/5. Recap Heuristic classifier.pptx
@@ -233,7 +233,7 @@
           <a:p>
             <a:fld id="{1A21894F-B278-4D96-9594-A030EA633187}" type="datetimeFigureOut">
               <a:rPr lang="it-IT" smtClean="0"/>
-              <a:t>07/11/2024</a:t>
+              <a:t>08/11/2024</a:t>
             </a:fld>
             <a:endParaRPr lang="it-IT"/>
           </a:p>
@@ -4789,7 +4789,7 @@
           <a:p>
             <a:fld id="{58E4D78B-0F35-4E3B-A0B9-554BA787D8A4}" type="datetime1">
               <a:rPr lang="en-US" smtClean="0"/>
-              <a:t>11/7/2024</a:t>
+              <a:t>11/8/2024</a:t>
             </a:fld>
             <a:endParaRPr lang="en-US"/>
           </a:p>
@@ -4999,7 +4999,7 @@
           <a:p>
             <a:fld id="{604487E5-BE79-4BAC-AEB7-0CE0533B5E5C}" type="datetime1">
               <a:rPr lang="en-US" smtClean="0"/>
-              <a:t>11/7/2024</a:t>
+              <a:t>11/8/2024</a:t>
             </a:fld>
             <a:endParaRPr lang="en-US"/>
           </a:p>
@@ -5199,7 +5199,7 @@
           <a:p>
             <a:fld id="{DDA7E0CB-9E21-49FD-99A0-0CD75BBC45F4}" type="datetime1">
               <a:rPr lang="en-US" smtClean="0"/>
-              <a:t>11/7/2024</a:t>
+              <a:t>11/8/2024</a:t>
             </a:fld>
             <a:endParaRPr lang="en-US"/>
           </a:p>
@@ -5475,7 +5475,7 @@
           <a:p>
             <a:fld id="{661D7149-FE96-419A-8F67-9BD351842985}" type="datetime1">
               <a:rPr lang="en-US" smtClean="0"/>
-              <a:t>11/7/2024</a:t>
+              <a:t>11/8/2024</a:t>
             </a:fld>
             <a:endParaRPr lang="en-US"/>
           </a:p>
@@ -5743,7 +5743,7 @@
           <a:p>
             <a:fld id="{6CA97CEF-DD94-4A20-85BC-5094F3EA8887}" type="datetime1">
               <a:rPr lang="en-US" smtClean="0"/>
-              <a:t>11/7/2024</a:t>
+              <a:t>11/8/2024</a:t>
             </a:fld>
             <a:endParaRPr lang="en-US"/>
           </a:p>
@@ -6158,7 +6158,7 @@
           <a:p>
             <a:fld id="{9862EB4C-45F8-47BA-B435-B6097D61B684}" type="datetime1">
               <a:rPr lang="en-US" smtClean="0"/>
-              <a:t>11/7/2024</a:t>
+              <a:t>11/8/2024</a:t>
             </a:fld>
             <a:endParaRPr lang="en-US"/>
           </a:p>
@@ -6300,7 +6300,7 @@
           <a:p>
             <a:fld id="{FA7CD0E2-B7EC-4D81-9389-8F889EE865AB}" type="datetime1">
               <a:rPr lang="en-US" smtClean="0"/>
-              <a:t>11/7/2024</a:t>
+              <a:t>11/8/2024</a:t>
             </a:fld>
             <a:endParaRPr lang="en-US"/>
           </a:p>
@@ -6413,7 +6413,7 @@
           <a:p>
             <a:fld id="{18B47F5C-7FA0-44DA-BF82-413AB90208B7}" type="datetime1">
               <a:rPr lang="en-US" smtClean="0"/>
-              <a:t>11/7/2024</a:t>
+              <a:t>11/8/2024</a:t>
             </a:fld>
             <a:endParaRPr lang="en-US"/>
           </a:p>
@@ -6726,7 +6726,7 @@
           <a:p>
             <a:fld id="{403415A8-F8BD-47CC-8D20-53798396961D}" type="datetime1">
               <a:rPr lang="en-US" smtClean="0"/>
-              <a:t>11/7/2024</a:t>
+              <a:t>11/8/2024</a:t>
             </a:fld>
             <a:endParaRPr lang="en-US"/>
           </a:p>
@@ -7015,7 +7015,7 @@
           <a:p>
             <a:fld id="{6A12F5A1-6669-4CDD-B1B4-04FFE5C41ADE}" type="datetime1">
               <a:rPr lang="en-US" smtClean="0"/>
-              <a:t>11/7/2024</a:t>
+              <a:t>11/8/2024</a:t>
             </a:fld>
             <a:endParaRPr lang="en-US"/>
           </a:p>
@@ -7219,7 +7219,7 @@
           <a:p>
             <a:fld id="{63421662-C242-4258-8799-9F32C0D7CC75}" type="datetime1">
               <a:rPr lang="en-US" smtClean="0"/>
-              <a:t>11/7/2024</a:t>
+              <a:t>11/8/2024</a:t>
             </a:fld>
             <a:endParaRPr lang="en-US"/>
           </a:p>
@@ -8184,7 +8184,7 @@
                 </a:solidFill>
                 <a:latin typeface="Calibri" panose="020F0502020204030204"/>
               </a:rPr>
-              <a:t>October</a:t>
+              <a:t>November</a:t>
             </a:r>
             <a:r>
               <a:rPr kumimoji="0" lang="en-US" sz="2800" b="0" i="0" u="none" strike="noStrike" kern="1200" cap="none" spc="0" normalizeH="0" baseline="0" noProof="0" dirty="0">
@@ -31580,7 +31580,12 @@
             <p:ph type="sldNum" sz="quarter" idx="12"/>
           </p:nvPr>
         </p:nvSpPr>
-        <p:spPr/>
+        <p:spPr>
+          <a:xfrm>
+            <a:off x="8610600" y="6492875"/>
+            <a:ext cx="2743200" cy="365125"/>
+          </a:xfrm>
+        </p:spPr>
         <p:txBody>
           <a:bodyPr/>
           <a:lstStyle/>
@@ -31890,51 +31895,6 @@
           </a:prstGeom>
         </p:spPr>
       </p:pic>
-      <p:cxnSp>
-        <p:nvCxnSpPr>
-          <p:cNvPr id="14" name="Connettore diritto 13">
-            <a:extLst>
-              <a:ext uri="{FF2B5EF4-FFF2-40B4-BE49-F238E27FC236}">
-                <a16:creationId xmlns:a16="http://schemas.microsoft.com/office/drawing/2014/main" id="{17E5A234-0DD7-7CC9-0414-043840BB146C}"/>
-              </a:ext>
-            </a:extLst>
-          </p:cNvPr>
-          <p:cNvCxnSpPr/>
-          <p:nvPr/>
-        </p:nvCxnSpPr>
-        <p:spPr>
-          <a:xfrm>
-            <a:off x="6601968" y="4956048"/>
-            <a:ext cx="3380232" cy="0"/>
-          </a:xfrm>
-          <a:prstGeom prst="line">
-            <a:avLst/>
-          </a:prstGeom>
-          <a:ln w="38100" cap="flat" cmpd="sng" algn="ctr">
-            <a:solidFill>
-              <a:schemeClr val="accent1"/>
-            </a:solidFill>
-            <a:prstDash val="dash"/>
-            <a:round/>
-            <a:headEnd type="none" w="med" len="med"/>
-            <a:tailEnd type="none" w="med" len="med"/>
-          </a:ln>
-        </p:spPr>
-        <p:style>
-          <a:lnRef idx="0">
-            <a:scrgbClr r="0" g="0" b="0"/>
-          </a:lnRef>
-          <a:fillRef idx="0">
-            <a:scrgbClr r="0" g="0" b="0"/>
-          </a:fillRef>
-          <a:effectRef idx="0">
-            <a:scrgbClr r="0" g="0" b="0"/>
-          </a:effectRef>
-          <a:fontRef idx="minor">
-            <a:schemeClr val="tx1"/>
-          </a:fontRef>
-        </p:style>
-      </p:cxnSp>
     </p:spTree>
     <p:extLst>
       <p:ext uri="{BB962C8B-B14F-4D97-AF65-F5344CB8AC3E}">
@@ -32355,685 +32315,6 @@
   <p:clrMapOvr>
     <a:masterClrMapping/>
   </p:clrMapOvr>
-  <p:timing>
-    <p:tnLst>
-      <p:par>
-        <p:cTn id="1" dur="indefinite" restart="never" nodeType="tmRoot">
-          <p:childTnLst>
-            <p:seq concurrent="1" nextAc="seek">
-              <p:cTn id="2" dur="indefinite" nodeType="mainSeq">
-                <p:childTnLst>
-                  <p:par>
-                    <p:cTn id="3" fill="hold">
-                      <p:stCondLst>
-                        <p:cond delay="indefinite"/>
-                      </p:stCondLst>
-                      <p:childTnLst>
-                        <p:par>
-                          <p:cTn id="4" fill="hold">
-                            <p:stCondLst>
-                              <p:cond delay="0"/>
-                            </p:stCondLst>
-                            <p:childTnLst>
-                              <p:par>
-                                <p:cTn id="5" presetID="2" presetClass="entr" presetSubtype="4" fill="hold" nodeType="clickEffect">
-                                  <p:stCondLst>
-                                    <p:cond delay="0"/>
-                                  </p:stCondLst>
-                                  <p:childTnLst>
-                                    <p:set>
-                                      <p:cBhvr>
-                                        <p:cTn id="6" dur="1" fill="hold">
-                                          <p:stCondLst>
-                                            <p:cond delay="0"/>
-                                          </p:stCondLst>
-                                        </p:cTn>
-                                        <p:tgtEl>
-                                          <p:spTgt spid="3">
-                                            <p:txEl>
-                                              <p:pRg st="0" end="0"/>
-                                            </p:txEl>
-                                          </p:spTgt>
-                                        </p:tgtEl>
-                                        <p:attrNameLst>
-                                          <p:attrName>style.visibility</p:attrName>
-                                        </p:attrNameLst>
-                                      </p:cBhvr>
-                                      <p:to>
-                                        <p:strVal val="visible"/>
-                                      </p:to>
-                                    </p:set>
-                                    <p:anim calcmode="lin" valueType="num">
-                                      <p:cBhvr additive="base">
-                                        <p:cTn id="7" dur="500" fill="hold"/>
-                                        <p:tgtEl>
-                                          <p:spTgt spid="3">
-                                            <p:txEl>
-                                              <p:pRg st="0" end="0"/>
-                                            </p:txEl>
-                                          </p:spTgt>
-                                        </p:tgtEl>
-                                        <p:attrNameLst>
-                                          <p:attrName>ppt_x</p:attrName>
-                                        </p:attrNameLst>
-                                      </p:cBhvr>
-                                      <p:tavLst>
-                                        <p:tav tm="0">
-                                          <p:val>
-                                            <p:strVal val="#ppt_x"/>
-                                          </p:val>
-                                        </p:tav>
-                                        <p:tav tm="100000">
-                                          <p:val>
-                                            <p:strVal val="#ppt_x"/>
-                                          </p:val>
-                                        </p:tav>
-                                      </p:tavLst>
-                                    </p:anim>
-                                    <p:anim calcmode="lin" valueType="num">
-                                      <p:cBhvr additive="base">
-                                        <p:cTn id="8" dur="500" fill="hold"/>
-                                        <p:tgtEl>
-                                          <p:spTgt spid="3">
-                                            <p:txEl>
-                                              <p:pRg st="0" end="0"/>
-                                            </p:txEl>
-                                          </p:spTgt>
-                                        </p:tgtEl>
-                                        <p:attrNameLst>
-                                          <p:attrName>ppt_y</p:attrName>
-                                        </p:attrNameLst>
-                                      </p:cBhvr>
-                                      <p:tavLst>
-                                        <p:tav tm="0">
-                                          <p:val>
-                                            <p:strVal val="1+#ppt_h/2"/>
-                                          </p:val>
-                                        </p:tav>
-                                        <p:tav tm="100000">
-                                          <p:val>
-                                            <p:strVal val="#ppt_y"/>
-                                          </p:val>
-                                        </p:tav>
-                                      </p:tavLst>
-                                    </p:anim>
-                                  </p:childTnLst>
-                                </p:cTn>
-                              </p:par>
-                              <p:par>
-                                <p:cTn id="9" presetID="2" presetClass="entr" presetSubtype="4" fill="hold" nodeType="withEffect">
-                                  <p:stCondLst>
-                                    <p:cond delay="0"/>
-                                  </p:stCondLst>
-                                  <p:childTnLst>
-                                    <p:set>
-                                      <p:cBhvr>
-                                        <p:cTn id="10" dur="1" fill="hold">
-                                          <p:stCondLst>
-                                            <p:cond delay="0"/>
-                                          </p:stCondLst>
-                                        </p:cTn>
-                                        <p:tgtEl>
-                                          <p:spTgt spid="3">
-                                            <p:txEl>
-                                              <p:pRg st="1" end="1"/>
-                                            </p:txEl>
-                                          </p:spTgt>
-                                        </p:tgtEl>
-                                        <p:attrNameLst>
-                                          <p:attrName>style.visibility</p:attrName>
-                                        </p:attrNameLst>
-                                      </p:cBhvr>
-                                      <p:to>
-                                        <p:strVal val="visible"/>
-                                      </p:to>
-                                    </p:set>
-                                    <p:anim calcmode="lin" valueType="num">
-                                      <p:cBhvr additive="base">
-                                        <p:cTn id="11" dur="500" fill="hold"/>
-                                        <p:tgtEl>
-                                          <p:spTgt spid="3">
-                                            <p:txEl>
-                                              <p:pRg st="1" end="1"/>
-                                            </p:txEl>
-                                          </p:spTgt>
-                                        </p:tgtEl>
-                                        <p:attrNameLst>
-                                          <p:attrName>ppt_x</p:attrName>
-                                        </p:attrNameLst>
-                                      </p:cBhvr>
-                                      <p:tavLst>
-                                        <p:tav tm="0">
-                                          <p:val>
-                                            <p:strVal val="#ppt_x"/>
-                                          </p:val>
-                                        </p:tav>
-                                        <p:tav tm="100000">
-                                          <p:val>
-                                            <p:strVal val="#ppt_x"/>
-                                          </p:val>
-                                        </p:tav>
-                                      </p:tavLst>
-                                    </p:anim>
-                                    <p:anim calcmode="lin" valueType="num">
-                                      <p:cBhvr additive="base">
-                                        <p:cTn id="12" dur="500" fill="hold"/>
-                                        <p:tgtEl>
-                                          <p:spTgt spid="3">
-                                            <p:txEl>
-                                              <p:pRg st="1" end="1"/>
-                                            </p:txEl>
-                                          </p:spTgt>
-                                        </p:tgtEl>
-                                        <p:attrNameLst>
-                                          <p:attrName>ppt_y</p:attrName>
-                                        </p:attrNameLst>
-                                      </p:cBhvr>
-                                      <p:tavLst>
-                                        <p:tav tm="0">
-                                          <p:val>
-                                            <p:strVal val="1+#ppt_h/2"/>
-                                          </p:val>
-                                        </p:tav>
-                                        <p:tav tm="100000">
-                                          <p:val>
-                                            <p:strVal val="#ppt_y"/>
-                                          </p:val>
-                                        </p:tav>
-                                      </p:tavLst>
-                                    </p:anim>
-                                  </p:childTnLst>
-                                </p:cTn>
-                              </p:par>
-                              <p:par>
-                                <p:cTn id="13" presetID="2" presetClass="entr" presetSubtype="4" fill="hold" nodeType="withEffect">
-                                  <p:stCondLst>
-                                    <p:cond delay="0"/>
-                                  </p:stCondLst>
-                                  <p:childTnLst>
-                                    <p:set>
-                                      <p:cBhvr>
-                                        <p:cTn id="14" dur="1" fill="hold">
-                                          <p:stCondLst>
-                                            <p:cond delay="0"/>
-                                          </p:stCondLst>
-                                        </p:cTn>
-                                        <p:tgtEl>
-                                          <p:spTgt spid="3">
-                                            <p:txEl>
-                                              <p:pRg st="2" end="2"/>
-                                            </p:txEl>
-                                          </p:spTgt>
-                                        </p:tgtEl>
-                                        <p:attrNameLst>
-                                          <p:attrName>style.visibility</p:attrName>
-                                        </p:attrNameLst>
-                                      </p:cBhvr>
-                                      <p:to>
-                                        <p:strVal val="visible"/>
-                                      </p:to>
-                                    </p:set>
-                                    <p:anim calcmode="lin" valueType="num">
-                                      <p:cBhvr additive="base">
-                                        <p:cTn id="15" dur="500" fill="hold"/>
-                                        <p:tgtEl>
-                                          <p:spTgt spid="3">
-                                            <p:txEl>
-                                              <p:pRg st="2" end="2"/>
-                                            </p:txEl>
-                                          </p:spTgt>
-                                        </p:tgtEl>
-                                        <p:attrNameLst>
-                                          <p:attrName>ppt_x</p:attrName>
-                                        </p:attrNameLst>
-                                      </p:cBhvr>
-                                      <p:tavLst>
-                                        <p:tav tm="0">
-                                          <p:val>
-                                            <p:strVal val="#ppt_x"/>
-                                          </p:val>
-                                        </p:tav>
-                                        <p:tav tm="100000">
-                                          <p:val>
-                                            <p:strVal val="#ppt_x"/>
-                                          </p:val>
-                                        </p:tav>
-                                      </p:tavLst>
-                                    </p:anim>
-                                    <p:anim calcmode="lin" valueType="num">
-                                      <p:cBhvr additive="base">
-                                        <p:cTn id="16" dur="500" fill="hold"/>
-                                        <p:tgtEl>
-                                          <p:spTgt spid="3">
-                                            <p:txEl>
-                                              <p:pRg st="2" end="2"/>
-                                            </p:txEl>
-                                          </p:spTgt>
-                                        </p:tgtEl>
-                                        <p:attrNameLst>
-                                          <p:attrName>ppt_y</p:attrName>
-                                        </p:attrNameLst>
-                                      </p:cBhvr>
-                                      <p:tavLst>
-                                        <p:tav tm="0">
-                                          <p:val>
-                                            <p:strVal val="1+#ppt_h/2"/>
-                                          </p:val>
-                                        </p:tav>
-                                        <p:tav tm="100000">
-                                          <p:val>
-                                            <p:strVal val="#ppt_y"/>
-                                          </p:val>
-                                        </p:tav>
-                                      </p:tavLst>
-                                    </p:anim>
-                                  </p:childTnLst>
-                                </p:cTn>
-                              </p:par>
-                            </p:childTnLst>
-                          </p:cTn>
-                        </p:par>
-                      </p:childTnLst>
-                    </p:cTn>
-                  </p:par>
-                  <p:par>
-                    <p:cTn id="17" fill="hold">
-                      <p:stCondLst>
-                        <p:cond delay="indefinite"/>
-                      </p:stCondLst>
-                      <p:childTnLst>
-                        <p:par>
-                          <p:cTn id="18" fill="hold">
-                            <p:stCondLst>
-                              <p:cond delay="0"/>
-                            </p:stCondLst>
-                            <p:childTnLst>
-                              <p:par>
-                                <p:cTn id="19" presetID="2" presetClass="entr" presetSubtype="4" fill="hold" nodeType="clickEffect">
-                                  <p:stCondLst>
-                                    <p:cond delay="0"/>
-                                  </p:stCondLst>
-                                  <p:childTnLst>
-                                    <p:set>
-                                      <p:cBhvr>
-                                        <p:cTn id="20" dur="1" fill="hold">
-                                          <p:stCondLst>
-                                            <p:cond delay="0"/>
-                                          </p:stCondLst>
-                                        </p:cTn>
-                                        <p:tgtEl>
-                                          <p:spTgt spid="3">
-                                            <p:txEl>
-                                              <p:pRg st="4" end="4"/>
-                                            </p:txEl>
-                                          </p:spTgt>
-                                        </p:tgtEl>
-                                        <p:attrNameLst>
-                                          <p:attrName>style.visibility</p:attrName>
-                                        </p:attrNameLst>
-                                      </p:cBhvr>
-                                      <p:to>
-                                        <p:strVal val="visible"/>
-                                      </p:to>
-                                    </p:set>
-                                    <p:anim calcmode="lin" valueType="num">
-                                      <p:cBhvr additive="base">
-                                        <p:cTn id="21" dur="500" fill="hold"/>
-                                        <p:tgtEl>
-                                          <p:spTgt spid="3">
-                                            <p:txEl>
-                                              <p:pRg st="4" end="4"/>
-                                            </p:txEl>
-                                          </p:spTgt>
-                                        </p:tgtEl>
-                                        <p:attrNameLst>
-                                          <p:attrName>ppt_x</p:attrName>
-                                        </p:attrNameLst>
-                                      </p:cBhvr>
-                                      <p:tavLst>
-                                        <p:tav tm="0">
-                                          <p:val>
-                                            <p:strVal val="#ppt_x"/>
-                                          </p:val>
-                                        </p:tav>
-                                        <p:tav tm="100000">
-                                          <p:val>
-                                            <p:strVal val="#ppt_x"/>
-                                          </p:val>
-                                        </p:tav>
-                                      </p:tavLst>
-                                    </p:anim>
-                                    <p:anim calcmode="lin" valueType="num">
-                                      <p:cBhvr additive="base">
-                                        <p:cTn id="22" dur="500" fill="hold"/>
-                                        <p:tgtEl>
-                                          <p:spTgt spid="3">
-                                            <p:txEl>
-                                              <p:pRg st="4" end="4"/>
-                                            </p:txEl>
-                                          </p:spTgt>
-                                        </p:tgtEl>
-                                        <p:attrNameLst>
-                                          <p:attrName>ppt_y</p:attrName>
-                                        </p:attrNameLst>
-                                      </p:cBhvr>
-                                      <p:tavLst>
-                                        <p:tav tm="0">
-                                          <p:val>
-                                            <p:strVal val="1+#ppt_h/2"/>
-                                          </p:val>
-                                        </p:tav>
-                                        <p:tav tm="100000">
-                                          <p:val>
-                                            <p:strVal val="#ppt_y"/>
-                                          </p:val>
-                                        </p:tav>
-                                      </p:tavLst>
-                                    </p:anim>
-                                  </p:childTnLst>
-                                </p:cTn>
-                              </p:par>
-                              <p:par>
-                                <p:cTn id="23" presetID="2" presetClass="entr" presetSubtype="4" fill="hold" nodeType="withEffect">
-                                  <p:stCondLst>
-                                    <p:cond delay="0"/>
-                                  </p:stCondLst>
-                                  <p:childTnLst>
-                                    <p:set>
-                                      <p:cBhvr>
-                                        <p:cTn id="24" dur="1" fill="hold">
-                                          <p:stCondLst>
-                                            <p:cond delay="0"/>
-                                          </p:stCondLst>
-                                        </p:cTn>
-                                        <p:tgtEl>
-                                          <p:spTgt spid="3">
-                                            <p:txEl>
-                                              <p:pRg st="5" end="5"/>
-                                            </p:txEl>
-                                          </p:spTgt>
-                                        </p:tgtEl>
-                                        <p:attrNameLst>
-                                          <p:attrName>style.visibility</p:attrName>
-                                        </p:attrNameLst>
-                                      </p:cBhvr>
-                                      <p:to>
-                                        <p:strVal val="visible"/>
-                                      </p:to>
-                                    </p:set>
-                                    <p:anim calcmode="lin" valueType="num">
-                                      <p:cBhvr additive="base">
-                                        <p:cTn id="25" dur="500" fill="hold"/>
-                                        <p:tgtEl>
-                                          <p:spTgt spid="3">
-                                            <p:txEl>
-                                              <p:pRg st="5" end="5"/>
-                                            </p:txEl>
-                                          </p:spTgt>
-                                        </p:tgtEl>
-                                        <p:attrNameLst>
-                                          <p:attrName>ppt_x</p:attrName>
-                                        </p:attrNameLst>
-                                      </p:cBhvr>
-                                      <p:tavLst>
-                                        <p:tav tm="0">
-                                          <p:val>
-                                            <p:strVal val="#ppt_x"/>
-                                          </p:val>
-                                        </p:tav>
-                                        <p:tav tm="100000">
-                                          <p:val>
-                                            <p:strVal val="#ppt_x"/>
-                                          </p:val>
-                                        </p:tav>
-                                      </p:tavLst>
-                                    </p:anim>
-                                    <p:anim calcmode="lin" valueType="num">
-                                      <p:cBhvr additive="base">
-                                        <p:cTn id="26" dur="500" fill="hold"/>
-                                        <p:tgtEl>
-                                          <p:spTgt spid="3">
-                                            <p:txEl>
-                                              <p:pRg st="5" end="5"/>
-                                            </p:txEl>
-                                          </p:spTgt>
-                                        </p:tgtEl>
-                                        <p:attrNameLst>
-                                          <p:attrName>ppt_y</p:attrName>
-                                        </p:attrNameLst>
-                                      </p:cBhvr>
-                                      <p:tavLst>
-                                        <p:tav tm="0">
-                                          <p:val>
-                                            <p:strVal val="1+#ppt_h/2"/>
-                                          </p:val>
-                                        </p:tav>
-                                        <p:tav tm="100000">
-                                          <p:val>
-                                            <p:strVal val="#ppt_y"/>
-                                          </p:val>
-                                        </p:tav>
-                                      </p:tavLst>
-                                    </p:anim>
-                                  </p:childTnLst>
-                                </p:cTn>
-                              </p:par>
-                            </p:childTnLst>
-                          </p:cTn>
-                        </p:par>
-                      </p:childTnLst>
-                    </p:cTn>
-                  </p:par>
-                  <p:par>
-                    <p:cTn id="27" fill="hold">
-                      <p:stCondLst>
-                        <p:cond delay="indefinite"/>
-                      </p:stCondLst>
-                      <p:childTnLst>
-                        <p:par>
-                          <p:cTn id="28" fill="hold">
-                            <p:stCondLst>
-                              <p:cond delay="0"/>
-                            </p:stCondLst>
-                            <p:childTnLst>
-                              <p:par>
-                                <p:cTn id="29" presetID="2" presetClass="entr" presetSubtype="4" fill="hold" nodeType="clickEffect">
-                                  <p:stCondLst>
-                                    <p:cond delay="0"/>
-                                  </p:stCondLst>
-                                  <p:childTnLst>
-                                    <p:set>
-                                      <p:cBhvr>
-                                        <p:cTn id="30" dur="1" fill="hold">
-                                          <p:stCondLst>
-                                            <p:cond delay="0"/>
-                                          </p:stCondLst>
-                                        </p:cTn>
-                                        <p:tgtEl>
-                                          <p:spTgt spid="3">
-                                            <p:txEl>
-                                              <p:pRg st="7" end="7"/>
-                                            </p:txEl>
-                                          </p:spTgt>
-                                        </p:tgtEl>
-                                        <p:attrNameLst>
-                                          <p:attrName>style.visibility</p:attrName>
-                                        </p:attrNameLst>
-                                      </p:cBhvr>
-                                      <p:to>
-                                        <p:strVal val="visible"/>
-                                      </p:to>
-                                    </p:set>
-                                    <p:anim calcmode="lin" valueType="num">
-                                      <p:cBhvr additive="base">
-                                        <p:cTn id="31" dur="500" fill="hold"/>
-                                        <p:tgtEl>
-                                          <p:spTgt spid="3">
-                                            <p:txEl>
-                                              <p:pRg st="7" end="7"/>
-                                            </p:txEl>
-                                          </p:spTgt>
-                                        </p:tgtEl>
-                                        <p:attrNameLst>
-                                          <p:attrName>ppt_x</p:attrName>
-                                        </p:attrNameLst>
-                                      </p:cBhvr>
-                                      <p:tavLst>
-                                        <p:tav tm="0">
-                                          <p:val>
-                                            <p:strVal val="#ppt_x"/>
-                                          </p:val>
-                                        </p:tav>
-                                        <p:tav tm="100000">
-                                          <p:val>
-                                            <p:strVal val="#ppt_x"/>
-                                          </p:val>
-                                        </p:tav>
-                                      </p:tavLst>
-                                    </p:anim>
-                                    <p:anim calcmode="lin" valueType="num">
-                                      <p:cBhvr additive="base">
-                                        <p:cTn id="32" dur="500" fill="hold"/>
-                                        <p:tgtEl>
-                                          <p:spTgt spid="3">
-                                            <p:txEl>
-                                              <p:pRg st="7" end="7"/>
-                                            </p:txEl>
-                                          </p:spTgt>
-                                        </p:tgtEl>
-                                        <p:attrNameLst>
-                                          <p:attrName>ppt_y</p:attrName>
-                                        </p:attrNameLst>
-                                      </p:cBhvr>
-                                      <p:tavLst>
-                                        <p:tav tm="0">
-                                          <p:val>
-                                            <p:strVal val="1+#ppt_h/2"/>
-                                          </p:val>
-                                        </p:tav>
-                                        <p:tav tm="100000">
-                                          <p:val>
-                                            <p:strVal val="#ppt_y"/>
-                                          </p:val>
-                                        </p:tav>
-                                      </p:tavLst>
-                                    </p:anim>
-                                  </p:childTnLst>
-                                </p:cTn>
-                              </p:par>
-                              <p:par>
-                                <p:cTn id="33" presetID="2" presetClass="entr" presetSubtype="4" fill="hold" nodeType="withEffect">
-                                  <p:stCondLst>
-                                    <p:cond delay="0"/>
-                                  </p:stCondLst>
-                                  <p:childTnLst>
-                                    <p:set>
-                                      <p:cBhvr>
-                                        <p:cTn id="34" dur="1" fill="hold">
-                                          <p:stCondLst>
-                                            <p:cond delay="0"/>
-                                          </p:stCondLst>
-                                        </p:cTn>
-                                        <p:tgtEl>
-                                          <p:spTgt spid="3">
-                                            <p:txEl>
-                                              <p:pRg st="8" end="8"/>
-                                            </p:txEl>
-                                          </p:spTgt>
-                                        </p:tgtEl>
-                                        <p:attrNameLst>
-                                          <p:attrName>style.visibility</p:attrName>
-                                        </p:attrNameLst>
-                                      </p:cBhvr>
-                                      <p:to>
-                                        <p:strVal val="visible"/>
-                                      </p:to>
-                                    </p:set>
-                                    <p:anim calcmode="lin" valueType="num">
-                                      <p:cBhvr additive="base">
-                                        <p:cTn id="35" dur="500" fill="hold"/>
-                                        <p:tgtEl>
-                                          <p:spTgt spid="3">
-                                            <p:txEl>
-                                              <p:pRg st="8" end="8"/>
-                                            </p:txEl>
-                                          </p:spTgt>
-                                        </p:tgtEl>
-                                        <p:attrNameLst>
-                                          <p:attrName>ppt_x</p:attrName>
-                                        </p:attrNameLst>
-                                      </p:cBhvr>
-                                      <p:tavLst>
-                                        <p:tav tm="0">
-                                          <p:val>
-                                            <p:strVal val="#ppt_x"/>
-                                          </p:val>
-                                        </p:tav>
-                                        <p:tav tm="100000">
-                                          <p:val>
-                                            <p:strVal val="#ppt_x"/>
-                                          </p:val>
-                                        </p:tav>
-                                      </p:tavLst>
-                                    </p:anim>
-                                    <p:anim calcmode="lin" valueType="num">
-                                      <p:cBhvr additive="base">
-                                        <p:cTn id="36" dur="500" fill="hold"/>
-                                        <p:tgtEl>
-                                          <p:spTgt spid="3">
-                                            <p:txEl>
-                                              <p:pRg st="8" end="8"/>
-                                            </p:txEl>
-                                          </p:spTgt>
-                                        </p:tgtEl>
-                                        <p:attrNameLst>
-                                          <p:attrName>ppt_y</p:attrName>
-                                        </p:attrNameLst>
-                                      </p:cBhvr>
-                                      <p:tavLst>
-                                        <p:tav tm="0">
-                                          <p:val>
-                                            <p:strVal val="1+#ppt_h/2"/>
-                                          </p:val>
-                                        </p:tav>
-                                        <p:tav tm="100000">
-                                          <p:val>
-                                            <p:strVal val="#ppt_y"/>
-                                          </p:val>
-                                        </p:tav>
-                                      </p:tavLst>
-                                    </p:anim>
-                                  </p:childTnLst>
-                                </p:cTn>
-                              </p:par>
-                            </p:childTnLst>
-                          </p:cTn>
-                        </p:par>
-                      </p:childTnLst>
-                    </p:cTn>
-                  </p:par>
-                </p:childTnLst>
-              </p:cTn>
-              <p:prevCondLst>
-                <p:cond evt="onPrev" delay="0">
-                  <p:tgtEl>
-                    <p:sldTgt/>
-                  </p:tgtEl>
-                </p:cond>
-              </p:prevCondLst>
-              <p:nextCondLst>
-                <p:cond evt="onNext" delay="0">
-                  <p:tgtEl>
-                    <p:sldTgt/>
-                  </p:tgtEl>
-                </p:cond>
-              </p:nextCondLst>
-            </p:seq>
-          </p:childTnLst>
-        </p:cTn>
-      </p:par>
-    </p:tnLst>
-  </p:timing>
 </p:sld>
 </file>
 

</xml_diff>